<commit_message>
upto python standard library
</commit_message>
<xml_diff>
--- a/PythonObjectOrientedProgramming_2/Inheritance/Python_MultipleInheritance.pptx
+++ b/PythonObjectOrientedProgramming_2/Inheritance/Python_MultipleInheritance.pptx
@@ -219,7 +219,7 @@
           <a:p>
             <a:fld id="{1BFFAC0A-C025-4A33-A7BB-EE1EDD9D79C2}" type="datetimeFigureOut">
               <a:rPr lang="en-US" smtClean="0"/>
-              <a:t>1/8/2024</a:t>
+              <a:t>1/17/2024</a:t>
             </a:fld>
             <a:endParaRPr lang="en-US"/>
           </a:p>
@@ -397,7 +397,7 @@
           <a:p>
             <a:fld id="{E447262F-5008-49DF-832D-01884A27659A}" type="datetimeFigureOut">
               <a:rPr lang="en-US" smtClean="0"/>
-              <a:t>1/8/2024</a:t>
+              <a:t>1/17/2024</a:t>
             </a:fld>
             <a:endParaRPr lang="en-US"/>
           </a:p>
@@ -814,7 +814,7 @@
           <a:p>
             <a:fld id="{D56E4E38-597A-4A0C-86DD-BC2C7CDEDA24}" type="datetime1">
               <a:rPr lang="en-US" smtClean="0"/>
-              <a:t>1/8/2024</a:t>
+              <a:t>1/17/2024</a:t>
             </a:fld>
             <a:endParaRPr lang="en-US"/>
           </a:p>
@@ -1012,7 +1012,7 @@
           <a:p>
             <a:fld id="{9EF2ED41-F136-449B-A582-6DD651F4230D}" type="datetime1">
               <a:rPr lang="en-US" smtClean="0"/>
-              <a:t>1/8/2024</a:t>
+              <a:t>1/17/2024</a:t>
             </a:fld>
             <a:endParaRPr lang="en-US"/>
           </a:p>
@@ -1153,7 +1153,7 @@
           <a:p>
             <a:fld id="{B0A75E3F-B9A5-4457-943D-67B4222F59F8}" type="datetime1">
               <a:rPr lang="en-US" smtClean="0"/>
-              <a:t>1/8/2024</a:t>
+              <a:t>1/17/2024</a:t>
             </a:fld>
             <a:endParaRPr lang="en-US"/>
           </a:p>
@@ -1362,7 +1362,7 @@
           <a:p>
             <a:fld id="{69E52530-2F5D-463B-A633-6A2B2E9A766A}" type="datetime1">
               <a:rPr lang="en-US" smtClean="0"/>
-              <a:t>1/8/2024</a:t>
+              <a:t>1/17/2024</a:t>
             </a:fld>
             <a:endParaRPr lang="en-US"/>
           </a:p>
@@ -1560,7 +1560,7 @@
           <a:p>
             <a:fld id="{7EEBE22E-A82E-4BB5-B462-A698C3DAFC1F}" type="datetime1">
               <a:rPr lang="en-US" smtClean="0"/>
-              <a:t>1/8/2024</a:t>
+              <a:t>1/17/2024</a:t>
             </a:fld>
             <a:endParaRPr lang="en-US"/>
           </a:p>
@@ -1846,7 +1846,7 @@
           <a:p>
             <a:fld id="{0C680828-38CF-4451-8244-68636A1C8CB5}" type="datetime1">
               <a:rPr lang="en-US" smtClean="0"/>
-              <a:t>1/8/2024</a:t>
+              <a:t>1/17/2024</a:t>
             </a:fld>
             <a:endParaRPr lang="en-US"/>
           </a:p>
@@ -2111,7 +2111,7 @@
           <a:p>
             <a:fld id="{8FFC2029-BEE1-4343-9ED9-92BA995C8865}" type="datetime1">
               <a:rPr lang="en-US" smtClean="0"/>
-              <a:t>1/8/2024</a:t>
+              <a:t>1/17/2024</a:t>
             </a:fld>
             <a:endParaRPr lang="en-US"/>
           </a:p>
@@ -2523,7 +2523,7 @@
           <a:p>
             <a:fld id="{66DC7041-2B29-44B2-871D-D86F30F5F5A7}" type="datetime1">
               <a:rPr lang="en-US" smtClean="0"/>
-              <a:t>1/8/2024</a:t>
+              <a:t>1/17/2024</a:t>
             </a:fld>
             <a:endParaRPr lang="en-US"/>
           </a:p>
@@ -2664,7 +2664,7 @@
           <a:p>
             <a:fld id="{D4EBD246-ACC3-4CD9-92C9-85D9E50191DC}" type="datetime1">
               <a:rPr lang="en-US" smtClean="0"/>
-              <a:t>1/8/2024</a:t>
+              <a:t>1/17/2024</a:t>
             </a:fld>
             <a:endParaRPr lang="en-US"/>
           </a:p>
@@ -2777,7 +2777,7 @@
           <a:p>
             <a:fld id="{FF5AAB86-C251-49C6-9048-122667BB41F5}" type="datetime1">
               <a:rPr lang="en-US" smtClean="0"/>
-              <a:t>1/8/2024</a:t>
+              <a:t>1/17/2024</a:t>
             </a:fld>
             <a:endParaRPr lang="en-US"/>
           </a:p>
@@ -3088,7 +3088,7 @@
           <a:p>
             <a:fld id="{E9212A80-760C-4B9C-9DA6-B64F006B1C69}" type="datetime1">
               <a:rPr lang="en-US" smtClean="0"/>
-              <a:t>1/8/2024</a:t>
+              <a:t>1/17/2024</a:t>
             </a:fld>
             <a:endParaRPr lang="en-US"/>
           </a:p>
@@ -3376,7 +3376,7 @@
           <a:p>
             <a:fld id="{CCC8F644-A7B6-4EDE-A73D-F227E609FD1E}" type="datetime1">
               <a:rPr lang="en-US" smtClean="0"/>
-              <a:t>1/8/2024</a:t>
+              <a:t>1/17/2024</a:t>
             </a:fld>
             <a:endParaRPr lang="en-US"/>
           </a:p>
@@ -3676,7 +3676,7 @@
           <a:p>
             <a:fld id="{B0A75E3F-B9A5-4457-943D-67B4222F59F8}" type="datetime1">
               <a:rPr lang="en-US" smtClean="0"/>
-              <a:t>1/8/2024</a:t>
+              <a:t>1/17/2024</a:t>
             </a:fld>
             <a:endParaRPr lang="en-US"/>
           </a:p>
@@ -4525,36 +4525,6 @@
           </a:p>
         </p:txBody>
       </p:sp>
-      <p:pic>
-        <p:nvPicPr>
-          <p:cNvPr id="7" name="Picture 6">
-            <a:extLst>
-              <a:ext uri="{FF2B5EF4-FFF2-40B4-BE49-F238E27FC236}">
-                <a16:creationId xmlns:a16="http://schemas.microsoft.com/office/drawing/2014/main" id="{F1F8FE3D-0BD8-9B5F-5A6D-99520D9B580E}"/>
-              </a:ext>
-            </a:extLst>
-          </p:cNvPr>
-          <p:cNvPicPr>
-            <a:picLocks noChangeAspect="1"/>
-          </p:cNvPicPr>
-          <p:nvPr/>
-        </p:nvPicPr>
-        <p:blipFill>
-          <a:blip r:embed="rId2"/>
-          <a:stretch>
-            <a:fillRect/>
-          </a:stretch>
-        </p:blipFill>
-        <p:spPr>
-          <a:xfrm>
-            <a:off x="5151038" y="3054063"/>
-            <a:ext cx="1889924" cy="749873"/>
-          </a:xfrm>
-          <a:prstGeom prst="rect">
-            <a:avLst/>
-          </a:prstGeom>
-        </p:spPr>
-      </p:pic>
     </p:spTree>
     <p:extLst>
       <p:ext uri="{BB962C8B-B14F-4D97-AF65-F5344CB8AC3E}">

</xml_diff>